<commit_message>
updated today's clicker questions.
</commit_message>
<xml_diff>
--- a/lectures/2018-04-26 quicksort and radix/clicker questions.pptx
+++ b/lectures/2018-04-26 quicksort and radix/clicker questions.pptx
@@ -6,8 +6,8 @@
   </p:sldMasterIdLst>
   <p:sldIdLst>
     <p:sldId id="256" r:id="rId2"/>
-    <p:sldId id="257" r:id="rId3"/>
-    <p:sldId id="258" r:id="rId4"/>
+    <p:sldId id="258" r:id="rId3"/>
+    <p:sldId id="259" r:id="rId4"/>
   </p:sldIdLst>
   <p:sldSz cx="12192000" cy="6858000"/>
   <p:notesSz cx="6858000" cy="9144000"/>
@@ -106,6 +106,11 @@
       </a:defRPr>
     </a:lvl9pPr>
   </p:defaultTextStyle>
+  <p:extLst>
+    <p:ext uri="{EFAFB233-063F-42B5-8137-9DF3F51BA10A}">
+      <p15:sldGuideLst xmlns:p15="http://schemas.microsoft.com/office/powerpoint/2012/main"/>
+    </p:ext>
+  </p:extLst>
 </p:presentation>
 </file>
 
@@ -240,7 +245,7 @@
           <a:p>
             <a:fld id="{C59BBD09-83E5-40B6-B006-79E76E9B16AF}" type="datetimeFigureOut">
               <a:rPr lang="en-US" smtClean="0"/>
-              <a:t>4/24/2018</a:t>
+              <a:t>4/26/2018</a:t>
             </a:fld>
             <a:endParaRPr lang="en-US"/>
           </a:p>
@@ -410,7 +415,7 @@
           <a:p>
             <a:fld id="{C59BBD09-83E5-40B6-B006-79E76E9B16AF}" type="datetimeFigureOut">
               <a:rPr lang="en-US" smtClean="0"/>
-              <a:t>4/24/2018</a:t>
+              <a:t>4/26/2018</a:t>
             </a:fld>
             <a:endParaRPr lang="en-US"/>
           </a:p>
@@ -590,7 +595,7 @@
           <a:p>
             <a:fld id="{C59BBD09-83E5-40B6-B006-79E76E9B16AF}" type="datetimeFigureOut">
               <a:rPr lang="en-US" smtClean="0"/>
-              <a:t>4/24/2018</a:t>
+              <a:t>4/26/2018</a:t>
             </a:fld>
             <a:endParaRPr lang="en-US"/>
           </a:p>
@@ -760,7 +765,7 @@
           <a:p>
             <a:fld id="{C59BBD09-83E5-40B6-B006-79E76E9B16AF}" type="datetimeFigureOut">
               <a:rPr lang="en-US" smtClean="0"/>
-              <a:t>4/24/2018</a:t>
+              <a:t>4/26/2018</a:t>
             </a:fld>
             <a:endParaRPr lang="en-US"/>
           </a:p>
@@ -1006,7 +1011,7 @@
           <a:p>
             <a:fld id="{C59BBD09-83E5-40B6-B006-79E76E9B16AF}" type="datetimeFigureOut">
               <a:rPr lang="en-US" smtClean="0"/>
-              <a:t>4/24/2018</a:t>
+              <a:t>4/26/2018</a:t>
             </a:fld>
             <a:endParaRPr lang="en-US"/>
           </a:p>
@@ -1238,7 +1243,7 @@
           <a:p>
             <a:fld id="{C59BBD09-83E5-40B6-B006-79E76E9B16AF}" type="datetimeFigureOut">
               <a:rPr lang="en-US" smtClean="0"/>
-              <a:t>4/24/2018</a:t>
+              <a:t>4/26/2018</a:t>
             </a:fld>
             <a:endParaRPr lang="en-US"/>
           </a:p>
@@ -1605,7 +1610,7 @@
           <a:p>
             <a:fld id="{C59BBD09-83E5-40B6-B006-79E76E9B16AF}" type="datetimeFigureOut">
               <a:rPr lang="en-US" smtClean="0"/>
-              <a:t>4/24/2018</a:t>
+              <a:t>4/26/2018</a:t>
             </a:fld>
             <a:endParaRPr lang="en-US"/>
           </a:p>
@@ -1723,7 +1728,7 @@
           <a:p>
             <a:fld id="{C59BBD09-83E5-40B6-B006-79E76E9B16AF}" type="datetimeFigureOut">
               <a:rPr lang="en-US" smtClean="0"/>
-              <a:t>4/24/2018</a:t>
+              <a:t>4/26/2018</a:t>
             </a:fld>
             <a:endParaRPr lang="en-US"/>
           </a:p>
@@ -1818,7 +1823,7 @@
           <a:p>
             <a:fld id="{C59BBD09-83E5-40B6-B006-79E76E9B16AF}" type="datetimeFigureOut">
               <a:rPr lang="en-US" smtClean="0"/>
-              <a:t>4/24/2018</a:t>
+              <a:t>4/26/2018</a:t>
             </a:fld>
             <a:endParaRPr lang="en-US"/>
           </a:p>
@@ -2095,7 +2100,7 @@
           <a:p>
             <a:fld id="{C59BBD09-83E5-40B6-B006-79E76E9B16AF}" type="datetimeFigureOut">
               <a:rPr lang="en-US" smtClean="0"/>
-              <a:t>4/24/2018</a:t>
+              <a:t>4/26/2018</a:t>
             </a:fld>
             <a:endParaRPr lang="en-US"/>
           </a:p>
@@ -2348,7 +2353,7 @@
           <a:p>
             <a:fld id="{C59BBD09-83E5-40B6-B006-79E76E9B16AF}" type="datetimeFigureOut">
               <a:rPr lang="en-US" smtClean="0"/>
-              <a:t>4/24/2018</a:t>
+              <a:t>4/26/2018</a:t>
             </a:fld>
             <a:endParaRPr lang="en-US"/>
           </a:p>
@@ -2561,7 +2566,7 @@
           <a:p>
             <a:fld id="{C59BBD09-83E5-40B6-B006-79E76E9B16AF}" type="datetimeFigureOut">
               <a:rPr lang="en-US" smtClean="0"/>
-              <a:t>4/24/2018</a:t>
+              <a:t>4/26/2018</a:t>
             </a:fld>
             <a:endParaRPr lang="en-US"/>
           </a:p>
@@ -3130,7 +3135,9 @@
           </a:xfrm>
         </p:spPr>
         <p:txBody>
-          <a:bodyPr/>
+          <a:bodyPr>
+            <a:normAutofit/>
+          </a:bodyPr>
           <a:lstStyle/>
           <a:p>
             <a:pPr marL="0" indent="0">
@@ -3138,7 +3145,7 @@
             </a:pPr>
             <a:r>
               <a:rPr lang="en-US" dirty="0" smtClean="0"/>
-              <a:t>The pivot for the following array to be sorted by quicksort is:</a:t>
+              <a:t>After one iteration of quicksort, what will the following array look like?</a:t>
             </a:r>
           </a:p>
           <a:p>
@@ -3155,12 +3162,6 @@
               <a:buNone/>
             </a:pPr>
             <a:endParaRPr lang="en-US" dirty="0" smtClean="0"/>
-          </a:p>
-          <a:p>
-            <a:pPr marL="0" indent="0">
-              <a:buNone/>
-            </a:pPr>
-            <a:endParaRPr lang="en-US" dirty="0"/>
           </a:p>
           <a:p>
             <a:pPr marL="0" indent="0">
@@ -3175,7 +3176,7 @@
             </a:pPr>
             <a:r>
               <a:rPr lang="en-US" dirty="0" smtClean="0"/>
-              <a:t>9</a:t>
+              <a:t>{1, 2, 3, 4, 5, 6, 7, 8, 9}</a:t>
             </a:r>
           </a:p>
           <a:p>
@@ -3185,7 +3186,7 @@
             </a:pPr>
             <a:r>
               <a:rPr lang="en-US" dirty="0" smtClean="0"/>
-              <a:t>1</a:t>
+              <a:t>{3, 1, 4, 2, 6, 7, 8, 9, 5}</a:t>
             </a:r>
           </a:p>
           <a:p>
@@ -3195,7 +3196,7 @@
             </a:pPr>
             <a:r>
               <a:rPr lang="en-US" dirty="0" smtClean="0"/>
-              <a:t>3</a:t>
+              <a:t>{3, 1, 4, 2, 5, 7, 8, 9, 6}</a:t>
             </a:r>
           </a:p>
           <a:p>
@@ -3205,27 +3206,7 @@
             </a:pPr>
             <a:r>
               <a:rPr lang="en-US" dirty="0" smtClean="0"/>
-              <a:t>5</a:t>
-            </a:r>
-          </a:p>
-          <a:p>
-            <a:pPr marL="514350" indent="-514350">
-              <a:buFont typeface="+mj-lt"/>
-              <a:buAutoNum type="alphaUcPeriod"/>
-            </a:pPr>
-            <a:r>
-              <a:rPr lang="en-US" dirty="0" smtClean="0"/>
-              <a:t>6</a:t>
-            </a:r>
-          </a:p>
-          <a:p>
-            <a:pPr marL="514350" indent="-514350">
-              <a:buFont typeface="+mj-lt"/>
-              <a:buAutoNum type="alphaUcPeriod"/>
-            </a:pPr>
-            <a:r>
-              <a:rPr lang="en-US" dirty="0"/>
-              <a:t>7</a:t>
+              <a:t>{3, 1, 8, 2, 6, 7, 4, 9, 5}</a:t>
             </a:r>
           </a:p>
         </p:txBody>
@@ -3233,7 +3214,7 @@
     </p:spTree>
     <p:extLst>
       <p:ext uri="{BB962C8B-B14F-4D97-AF65-F5344CB8AC3E}">
-        <p14:creationId xmlns:p14="http://schemas.microsoft.com/office/powerpoint/2010/main" val="2656203967"/>
+        <p14:creationId xmlns:p14="http://schemas.microsoft.com/office/powerpoint/2010/main" val="3842475586"/>
       </p:ext>
     </p:extLst>
   </p:cSld>
@@ -3287,8 +3268,13 @@
             </a:pPr>
             <a:r>
               <a:rPr lang="en-US" dirty="0" smtClean="0"/>
-              <a:t>After one iteration of quicksort, what will the following array look like?</a:t>
-            </a:r>
+              <a:t>After one iteration of </a:t>
+            </a:r>
+            <a:r>
+              <a:rPr lang="en-US" dirty="0" smtClean="0"/>
+              <a:t>radix sort, the array will look like:</a:t>
+            </a:r>
+            <a:endParaRPr lang="en-US" dirty="0" smtClean="0"/>
           </a:p>
           <a:p>
             <a:pPr marL="0" indent="0">
@@ -3296,8 +3282,9 @@
             </a:pPr>
             <a:r>
               <a:rPr lang="en-US" dirty="0" smtClean="0"/>
-              <a:t>{9, 1, 8, 2, 6, 7, 4, 3, 5}.  </a:t>
-            </a:r>
+              <a:t>{99, 87, 77, 23, 12, 5, 80}.  </a:t>
+            </a:r>
+            <a:endParaRPr lang="en-US" dirty="0" smtClean="0"/>
           </a:p>
           <a:p>
             <a:pPr marL="0" indent="0">
@@ -3318,7 +3305,7 @@
             </a:pPr>
             <a:r>
               <a:rPr lang="en-US" dirty="0" smtClean="0"/>
-              <a:t>{1, 2, 3, 4, 5, 6, 7, 8, 9}</a:t>
+              <a:t>{5, 80, 12, 23, 87, 77, 99}</a:t>
             </a:r>
             <a:endParaRPr lang="en-US" dirty="0" smtClean="0"/>
           </a:p>
@@ -3329,7 +3316,7 @@
             </a:pPr>
             <a:r>
               <a:rPr lang="en-US" dirty="0" smtClean="0"/>
-              <a:t>{3, 1, 4, 2, 6, 7, 8, 9, 5}</a:t>
+              <a:t>{5, 12, 23, 77, 87, 80, 99}</a:t>
             </a:r>
             <a:endParaRPr lang="en-US" dirty="0" smtClean="0"/>
           </a:p>
@@ -3339,10 +3326,17 @@
               <a:buAutoNum type="alphaUcPeriod"/>
             </a:pPr>
             <a:r>
+              <a:rPr lang="en-US" dirty="0"/>
+              <a:t>{5, 80, 12, 23, </a:t>
+            </a:r>
+            <a:r>
               <a:rPr lang="en-US" dirty="0" smtClean="0"/>
-              <a:t>{3, 1, 4, 2, 5, 7, 8, 9, 6}</a:t>
-            </a:r>
-            <a:endParaRPr lang="en-US" dirty="0" smtClean="0"/>
+              <a:t>77, 87, </a:t>
+            </a:r>
+            <a:r>
+              <a:rPr lang="en-US" dirty="0"/>
+              <a:t>99}</a:t>
+            </a:r>
           </a:p>
           <a:p>
             <a:pPr marL="514350" indent="-514350">
@@ -3350,16 +3344,17 @@
               <a:buAutoNum type="alphaUcPeriod"/>
             </a:pPr>
             <a:r>
-              <a:rPr lang="en-US" dirty="0" smtClean="0"/>
-              <a:t>{3, 1, 8, 2, 6, 7, 4, 9, 5}</a:t>
-            </a:r>
+              <a:rPr lang="en-US" smtClean="0"/>
+              <a:t>{5, 12, 23, 77, 80, 87, 99}</a:t>
+            </a:r>
+            <a:endParaRPr lang="en-US" dirty="0" smtClean="0"/>
           </a:p>
         </p:txBody>
       </p:sp>
     </p:spTree>
     <p:extLst>
       <p:ext uri="{BB962C8B-B14F-4D97-AF65-F5344CB8AC3E}">
-        <p14:creationId xmlns:p14="http://schemas.microsoft.com/office/powerpoint/2010/main" val="3842475586"/>
+        <p14:creationId xmlns:p14="http://schemas.microsoft.com/office/powerpoint/2010/main" val="826565955"/>
       </p:ext>
     </p:extLst>
   </p:cSld>

</xml_diff>